<commit_message>
Feito o Wireframe da tela da Área do Cliente entre outras coisas.
</commit_message>
<xml_diff>
--- a/Projeto ERP WEB/Análise ERP WEB BioSistema.pptx
+++ b/Projeto ERP WEB/Análise ERP WEB BioSistema.pptx
@@ -5,14 +5,15 @@
     <p:sldMasterId id="2147483648" r:id="rId1"/>
   </p:sldMasterIdLst>
   <p:notesMasterIdLst>
-    <p:notesMasterId r:id="rId7"/>
+    <p:notesMasterId r:id="rId8"/>
   </p:notesMasterIdLst>
   <p:sldIdLst>
     <p:sldId id="258" r:id="rId2"/>
     <p:sldId id="259" r:id="rId3"/>
-    <p:sldId id="261" r:id="rId4"/>
-    <p:sldId id="260" r:id="rId5"/>
-    <p:sldId id="262" r:id="rId6"/>
+    <p:sldId id="263" r:id="rId4"/>
+    <p:sldId id="261" r:id="rId5"/>
+    <p:sldId id="260" r:id="rId6"/>
+    <p:sldId id="262" r:id="rId7"/>
   </p:sldIdLst>
   <p:sldSz cx="9144000" cy="6858000" type="screen4x3"/>
   <p:notesSz cx="6858000" cy="9144000"/>
@@ -196,7 +197,7 @@
           <a:p>
             <a:fld id="{6243CB1A-BA5C-4C34-AC0C-90CC0C1B0E03}" type="datetimeFigureOut">
               <a:rPr lang="pt-BR" smtClean="0"/>
-              <a:t>31/05/2023</a:t>
+              <a:t>01/06/2023</a:t>
             </a:fld>
             <a:endParaRPr lang="pt-BR" dirty="0"/>
           </a:p>
@@ -609,24 +610,6 @@
             </a:r>
           </a:p>
           <a:p>
-            <a:r>
-              <a:rPr lang="pt-BR" baseline="0" dirty="0" smtClean="0"/>
-              <a:t>-Logo do sistema</a:t>
-            </a:r>
-          </a:p>
-          <a:p>
-            <a:r>
-              <a:rPr lang="pt-BR" baseline="0" dirty="0" smtClean="0"/>
-              <a:t>-Alertas / notificações</a:t>
-            </a:r>
-          </a:p>
-          <a:p>
-            <a:r>
-              <a:rPr lang="pt-BR" baseline="0" dirty="0" smtClean="0"/>
-              <a:t>-Identificação do usuário e a empresa à qual pertence</a:t>
-            </a:r>
-          </a:p>
-          <a:p>
             <a:pPr marL="0" marR="0" indent="0" algn="l" defTabSz="914400" rtl="0" eaLnBrk="1" fontAlgn="auto" latinLnBrk="0" hangingPunct="1">
               <a:lnSpc>
                 <a:spcPct val="100000"/>
@@ -645,12 +628,8 @@
               <a:defRPr/>
             </a:pPr>
             <a:r>
-              <a:rPr lang="pt-BR" dirty="0" smtClean="0"/>
-              <a:t>-Colar</a:t>
-            </a:r>
-            <a:r>
               <a:rPr lang="pt-BR" baseline="0" dirty="0" smtClean="0"/>
-              <a:t> Trilha de navegação do usuário</a:t>
+              <a:t>-Logo do sistema</a:t>
             </a:r>
           </a:p>
           <a:p>
@@ -671,15 +650,30 @@
               <a:tabLst/>
               <a:defRPr/>
             </a:pPr>
-            <a:endParaRPr lang="pt-BR" sz="1200" b="1" i="0" kern="1200" baseline="0" dirty="0" smtClean="0">
-              <a:solidFill>
-                <a:schemeClr val="tx1"/>
-              </a:solidFill>
-              <a:effectLst/>
-              <a:latin typeface="+mn-lt"/>
-              <a:ea typeface="+mn-ea"/>
-              <a:cs typeface="+mn-cs"/>
-            </a:endParaRPr>
+            <a:r>
+              <a:rPr lang="pt-BR" dirty="0" smtClean="0"/>
+              <a:t>-</a:t>
+            </a:r>
+            <a:r>
+              <a:rPr lang="pt-BR" baseline="0" dirty="0" smtClean="0"/>
+              <a:t>Trilha de navegação do usuário</a:t>
+            </a:r>
+          </a:p>
+          <a:p>
+            <a:r>
+              <a:rPr lang="pt-BR" baseline="0" dirty="0" smtClean="0"/>
+              <a:t>-</a:t>
+            </a:r>
+            <a:r>
+              <a:rPr lang="pt-BR" baseline="0" dirty="0" smtClean="0"/>
+              <a:t>Alertas / notificações</a:t>
+            </a:r>
+          </a:p>
+          <a:p>
+            <a:r>
+              <a:rPr lang="pt-BR" baseline="0" dirty="0" smtClean="0"/>
+              <a:t>-Identificação do usuário e a empresa à qual pertence</a:t>
+            </a:r>
           </a:p>
           <a:p>
             <a:pPr marL="0" marR="0" indent="0" algn="l" defTabSz="914400" rtl="0" eaLnBrk="1" fontAlgn="auto" latinLnBrk="0" hangingPunct="1">
@@ -699,18 +693,15 @@
               <a:tabLst/>
               <a:defRPr/>
             </a:pPr>
-            <a:r>
-              <a:rPr lang="pt-BR" sz="1200" b="1" i="0" kern="1200" dirty="0" smtClean="0">
-                <a:solidFill>
-                  <a:schemeClr val="tx1"/>
-                </a:solidFill>
-                <a:effectLst/>
-                <a:latin typeface="+mn-lt"/>
-                <a:ea typeface="+mn-ea"/>
-                <a:cs typeface="+mn-cs"/>
-              </a:rPr>
-              <a:t>Menu:</a:t>
-            </a:r>
+            <a:endParaRPr lang="pt-BR" sz="1200" b="1" i="0" kern="1200" baseline="0" dirty="0" smtClean="0">
+              <a:solidFill>
+                <a:schemeClr val="tx1"/>
+              </a:solidFill>
+              <a:effectLst/>
+              <a:latin typeface="+mn-lt"/>
+              <a:ea typeface="+mn-ea"/>
+              <a:cs typeface="+mn-cs"/>
+            </a:endParaRPr>
           </a:p>
           <a:p>
             <a:pPr marL="0" marR="0" indent="0" algn="l" defTabSz="914400" rtl="0" eaLnBrk="1" fontAlgn="auto" latinLnBrk="0" hangingPunct="1">
@@ -731,7 +722,7 @@
               <a:defRPr/>
             </a:pPr>
             <a:r>
-              <a:rPr lang="pt-BR" sz="1200" b="0" i="0" kern="1200" dirty="0" smtClean="0">
+              <a:rPr lang="pt-BR" sz="1200" b="1" i="0" kern="1200" dirty="0" smtClean="0">
                 <a:solidFill>
                   <a:schemeClr val="tx1"/>
                 </a:solidFill>
@@ -740,29 +731,8 @@
                 <a:ea typeface="+mn-ea"/>
                 <a:cs typeface="+mn-cs"/>
               </a:rPr>
-              <a:t>-Ter somente os módulos que o usuário pode acessar / utilizar</a:t>
-            </a:r>
-            <a:r>
-              <a:rPr lang="pt-BR" sz="1200" b="0" i="0" kern="1200" baseline="0" dirty="0" smtClean="0">
-                <a:solidFill>
-                  <a:schemeClr val="tx1"/>
-                </a:solidFill>
-                <a:effectLst/>
-                <a:latin typeface="+mn-lt"/>
-                <a:ea typeface="+mn-ea"/>
-                <a:cs typeface="+mn-cs"/>
-              </a:rPr>
-              <a:t> .</a:t>
-            </a:r>
-            <a:endParaRPr lang="pt-BR" sz="1200" b="0" i="0" kern="1200" dirty="0" smtClean="0">
-              <a:solidFill>
-                <a:schemeClr val="tx1"/>
-              </a:solidFill>
-              <a:effectLst/>
-              <a:latin typeface="+mn-lt"/>
-              <a:ea typeface="+mn-ea"/>
-              <a:cs typeface="+mn-cs"/>
-            </a:endParaRPr>
+              <a:t>Menu:</a:t>
+            </a:r>
           </a:p>
           <a:p>
             <a:pPr marL="0" marR="0" indent="0" algn="l" defTabSz="914400" rtl="0" eaLnBrk="1" fontAlgn="auto" latinLnBrk="0" hangingPunct="1">
@@ -782,7 +752,79 @@
               <a:tabLst/>
               <a:defRPr/>
             </a:pPr>
-            <a:endParaRPr lang="pt-BR" sz="1200" b="1" i="0" kern="1200" dirty="0" smtClean="0">
+            <a:r>
+              <a:rPr lang="pt-BR" sz="1200" b="0" i="0" kern="1200" dirty="0" smtClean="0">
+                <a:solidFill>
+                  <a:schemeClr val="tx1"/>
+                </a:solidFill>
+                <a:effectLst/>
+                <a:latin typeface="+mn-lt"/>
+                <a:ea typeface="+mn-ea"/>
+                <a:cs typeface="+mn-cs"/>
+              </a:rPr>
+              <a:t>-Ter somente os módulos </a:t>
+            </a:r>
+            <a:r>
+              <a:rPr lang="pt-BR" sz="1200" b="0" i="0" kern="1200" dirty="0" smtClean="0">
+                <a:solidFill>
+                  <a:schemeClr val="tx1"/>
+                </a:solidFill>
+                <a:effectLst/>
+                <a:latin typeface="+mn-lt"/>
+                <a:ea typeface="+mn-ea"/>
+                <a:cs typeface="+mn-cs"/>
+              </a:rPr>
+              <a:t>de</a:t>
+            </a:r>
+            <a:r>
+              <a:rPr lang="pt-BR" sz="1200" b="0" i="0" kern="1200" baseline="0" dirty="0" smtClean="0">
+                <a:solidFill>
+                  <a:schemeClr val="tx1"/>
+                </a:solidFill>
+                <a:effectLst/>
+                <a:latin typeface="+mn-lt"/>
+                <a:ea typeface="+mn-ea"/>
+                <a:cs typeface="+mn-cs"/>
+              </a:rPr>
+              <a:t> acordo com o perfil do</a:t>
+            </a:r>
+            <a:r>
+              <a:rPr lang="pt-BR" sz="1200" b="0" i="0" kern="1200" dirty="0" smtClean="0">
+                <a:solidFill>
+                  <a:schemeClr val="tx1"/>
+                </a:solidFill>
+                <a:effectLst/>
+                <a:latin typeface="+mn-lt"/>
+                <a:ea typeface="+mn-ea"/>
+                <a:cs typeface="+mn-cs"/>
+              </a:rPr>
+              <a:t> usuário</a:t>
+            </a:r>
+            <a:r>
+              <a:rPr lang="pt-BR" sz="1200" b="0" i="0" kern="1200" baseline="0" dirty="0" smtClean="0">
+                <a:solidFill>
+                  <a:schemeClr val="tx1"/>
+                </a:solidFill>
+                <a:effectLst/>
+                <a:latin typeface="+mn-lt"/>
+                <a:ea typeface="+mn-ea"/>
+                <a:cs typeface="+mn-cs"/>
+              </a:rPr>
+              <a:t> </a:t>
+            </a:r>
+            <a:r>
+              <a:rPr lang="pt-BR" sz="1200" b="0" i="0" kern="1200" baseline="0" dirty="0" smtClean="0">
+                <a:solidFill>
+                  <a:schemeClr val="tx1"/>
+                </a:solidFill>
+                <a:effectLst/>
+                <a:latin typeface="+mn-lt"/>
+                <a:ea typeface="+mn-ea"/>
+                <a:cs typeface="+mn-cs"/>
+              </a:rPr>
+              <a:t>.</a:t>
+            </a:r>
+            <a:endParaRPr lang="pt-BR" sz="1200" b="0" i="0" kern="1200" dirty="0" smtClean="0">
               <a:solidFill>
                 <a:schemeClr val="tx1"/>
               </a:solidFill>
@@ -810,30 +852,15 @@
               <a:tabLst/>
               <a:defRPr/>
             </a:pPr>
-            <a:r>
-              <a:rPr lang="pt-BR" sz="1200" b="1" i="0" kern="1200" dirty="0" smtClean="0">
-                <a:solidFill>
-                  <a:schemeClr val="tx1"/>
-                </a:solidFill>
-                <a:effectLst/>
-                <a:latin typeface="+mn-lt"/>
-                <a:ea typeface="+mn-ea"/>
-                <a:cs typeface="+mn-cs"/>
-              </a:rPr>
-              <a:t>Conteúdo</a:t>
-            </a:r>
-            <a:r>
-              <a:rPr lang="pt-BR" sz="1200" b="1" i="0" kern="1200" baseline="0" dirty="0" smtClean="0">
-                <a:solidFill>
-                  <a:schemeClr val="tx1"/>
-                </a:solidFill>
-                <a:effectLst/>
-                <a:latin typeface="+mn-lt"/>
-                <a:ea typeface="+mn-ea"/>
-                <a:cs typeface="+mn-cs"/>
-              </a:rPr>
-              <a:t>:</a:t>
-            </a:r>
+            <a:endParaRPr lang="pt-BR" sz="1200" b="1" i="0" kern="1200" dirty="0" smtClean="0">
+              <a:solidFill>
+                <a:schemeClr val="tx1"/>
+              </a:solidFill>
+              <a:effectLst/>
+              <a:latin typeface="+mn-lt"/>
+              <a:ea typeface="+mn-ea"/>
+              <a:cs typeface="+mn-cs"/>
+            </a:endParaRPr>
           </a:p>
           <a:p>
             <a:pPr marL="0" marR="0" indent="0" algn="l" defTabSz="914400" rtl="0" eaLnBrk="1" fontAlgn="auto" latinLnBrk="0" hangingPunct="1">
@@ -854,7 +881,7 @@
               <a:defRPr/>
             </a:pPr>
             <a:r>
-              <a:rPr lang="pt-BR" sz="1200" b="0" i="0" kern="1200" baseline="0" dirty="0" smtClean="0">
+              <a:rPr lang="pt-BR" sz="1200" b="1" i="0" kern="1200" dirty="0" smtClean="0">
                 <a:solidFill>
                   <a:schemeClr val="tx1"/>
                 </a:solidFill>
@@ -863,7 +890,19 @@
                 <a:ea typeface="+mn-ea"/>
                 <a:cs typeface="+mn-cs"/>
               </a:rPr>
-              <a:t>Apresentação dos elementos do módulo. O mais simples possível e à medida que for necessário mais elementos, eles serão apresentados.</a:t>
+              <a:t>Conteúdo</a:t>
+            </a:r>
+            <a:r>
+              <a:rPr lang="pt-BR" sz="1200" b="1" i="0" kern="1200" baseline="0" dirty="0" smtClean="0">
+                <a:solidFill>
+                  <a:schemeClr val="tx1"/>
+                </a:solidFill>
+                <a:effectLst/>
+                <a:latin typeface="+mn-lt"/>
+                <a:ea typeface="+mn-ea"/>
+                <a:cs typeface="+mn-cs"/>
+              </a:rPr>
+              <a:t>:</a:t>
             </a:r>
           </a:p>
           <a:p>
@@ -894,19 +933,7 @@
                 <a:ea typeface="+mn-ea"/>
                 <a:cs typeface="+mn-cs"/>
               </a:rPr>
-              <a:t>Única seção que </a:t>
-            </a:r>
-            <a:r>
-              <a:rPr lang="pt-BR" sz="1200" b="0" i="0" kern="1200" baseline="0" dirty="0" err="1" smtClean="0">
-                <a:solidFill>
-                  <a:schemeClr val="tx1"/>
-                </a:solidFill>
-                <a:effectLst/>
-                <a:latin typeface="+mn-lt"/>
-                <a:ea typeface="+mn-ea"/>
-                <a:cs typeface="+mn-cs"/>
-              </a:rPr>
-              <a:t>scrolável</a:t>
+              <a:t>Funções </a:t>
             </a:r>
             <a:r>
               <a:rPr lang="pt-BR" sz="1200" b="0" i="0" kern="1200" baseline="0" dirty="0" smtClean="0">
@@ -918,7 +945,55 @@
                 <a:ea typeface="+mn-ea"/>
                 <a:cs typeface="+mn-cs"/>
               </a:rPr>
-              <a:t> , só que o mínimo possível.</a:t>
+              <a:t>do módulo. O mais simples possível e à medida que for </a:t>
+            </a:r>
+            <a:r>
+              <a:rPr lang="pt-BR" sz="1200" b="0" i="0" kern="1200" baseline="0" dirty="0" smtClean="0">
+                <a:solidFill>
+                  <a:schemeClr val="tx1"/>
+                </a:solidFill>
+                <a:effectLst/>
+                <a:latin typeface="+mn-lt"/>
+                <a:ea typeface="+mn-ea"/>
+                <a:cs typeface="+mn-cs"/>
+              </a:rPr>
+              <a:t>necessário, </a:t>
+            </a:r>
+            <a:r>
+              <a:rPr lang="pt-BR" sz="1200" b="0" i="0" kern="1200" baseline="0" dirty="0" smtClean="0">
+                <a:solidFill>
+                  <a:schemeClr val="tx1"/>
+                </a:solidFill>
+                <a:effectLst/>
+                <a:latin typeface="+mn-lt"/>
+                <a:ea typeface="+mn-ea"/>
+                <a:cs typeface="+mn-cs"/>
+              </a:rPr>
+              <a:t>mais </a:t>
+            </a:r>
+            <a:r>
+              <a:rPr lang="pt-BR" sz="1200" b="0" i="0" kern="1200" baseline="0" dirty="0" smtClean="0">
+                <a:solidFill>
+                  <a:schemeClr val="tx1"/>
+                </a:solidFill>
+                <a:effectLst/>
+                <a:latin typeface="+mn-lt"/>
+                <a:ea typeface="+mn-ea"/>
+                <a:cs typeface="+mn-cs"/>
+              </a:rPr>
+              <a:t>elementos </a:t>
+            </a:r>
+            <a:r>
+              <a:rPr lang="pt-BR" sz="1200" b="0" i="0" kern="1200" baseline="0" dirty="0" smtClean="0">
+                <a:solidFill>
+                  <a:schemeClr val="tx1"/>
+                </a:solidFill>
+                <a:effectLst/>
+                <a:latin typeface="+mn-lt"/>
+                <a:ea typeface="+mn-ea"/>
+                <a:cs typeface="+mn-cs"/>
+              </a:rPr>
+              <a:t>serão apresentados.</a:t>
             </a:r>
           </a:p>
           <a:p>
@@ -939,15 +1014,42 @@
               <a:tabLst/>
               <a:defRPr/>
             </a:pPr>
-            <a:endParaRPr lang="pt-BR" sz="1200" b="0" i="0" kern="1200" baseline="0" dirty="0" smtClean="0">
-              <a:solidFill>
-                <a:schemeClr val="tx1"/>
-              </a:solidFill>
-              <a:effectLst/>
-              <a:latin typeface="+mn-lt"/>
-              <a:ea typeface="+mn-ea"/>
-              <a:cs typeface="+mn-cs"/>
-            </a:endParaRPr>
+            <a:r>
+              <a:rPr lang="pt-BR" sz="1200" b="0" i="0" kern="1200" baseline="0" dirty="0" err="1" smtClean="0">
+                <a:solidFill>
+                  <a:schemeClr val="tx1"/>
+                </a:solidFill>
+                <a:effectLst/>
+                <a:latin typeface="+mn-lt"/>
+                <a:ea typeface="+mn-ea"/>
+                <a:cs typeface="+mn-cs"/>
+              </a:rPr>
+              <a:t>Scrolável</a:t>
+            </a:r>
+            <a:r>
+              <a:rPr lang="pt-BR" sz="1200" b="0" i="0" kern="1200" baseline="0" dirty="0" smtClean="0">
+                <a:solidFill>
+                  <a:schemeClr val="tx1"/>
+                </a:solidFill>
+                <a:effectLst/>
+                <a:latin typeface="+mn-lt"/>
+                <a:ea typeface="+mn-ea"/>
+                <a:cs typeface="+mn-cs"/>
+              </a:rPr>
+              <a:t> </a:t>
+            </a:r>
+            <a:r>
+              <a:rPr lang="pt-BR" sz="1200" b="0" i="0" kern="1200" baseline="0" dirty="0" smtClean="0">
+                <a:solidFill>
+                  <a:schemeClr val="tx1"/>
+                </a:solidFill>
+                <a:effectLst/>
+                <a:latin typeface="+mn-lt"/>
+                <a:ea typeface="+mn-ea"/>
+                <a:cs typeface="+mn-cs"/>
+              </a:rPr>
+              <a:t>, só que o mínimo possível.</a:t>
+            </a:r>
           </a:p>
           <a:p>
             <a:pPr marL="0" marR="0" indent="0" algn="l" defTabSz="914400" rtl="0" eaLnBrk="1" fontAlgn="auto" latinLnBrk="0" hangingPunct="1">
@@ -967,18 +1069,15 @@
               <a:tabLst/>
               <a:defRPr/>
             </a:pPr>
-            <a:r>
-              <a:rPr lang="pt-BR" sz="1200" b="1" i="0" kern="1200" baseline="0" dirty="0" smtClean="0">
-                <a:solidFill>
-                  <a:schemeClr val="tx1"/>
-                </a:solidFill>
-                <a:effectLst/>
-                <a:latin typeface="+mn-lt"/>
-                <a:ea typeface="+mn-ea"/>
-                <a:cs typeface="+mn-cs"/>
-              </a:rPr>
-              <a:t>Rodapé:</a:t>
-            </a:r>
+            <a:endParaRPr lang="pt-BR" sz="1200" b="0" i="0" kern="1200" baseline="0" dirty="0" smtClean="0">
+              <a:solidFill>
+                <a:schemeClr val="tx1"/>
+              </a:solidFill>
+              <a:effectLst/>
+              <a:latin typeface="+mn-lt"/>
+              <a:ea typeface="+mn-ea"/>
+              <a:cs typeface="+mn-cs"/>
+            </a:endParaRPr>
           </a:p>
           <a:p>
             <a:pPr marL="0" marR="0" indent="0" algn="l" defTabSz="914400" rtl="0" eaLnBrk="1" fontAlgn="auto" latinLnBrk="0" hangingPunct="1">
@@ -999,7 +1098,7 @@
               <a:defRPr/>
             </a:pPr>
             <a:r>
-              <a:rPr lang="pt-BR" sz="1200" b="0" i="0" kern="1200" dirty="0" smtClean="0">
+              <a:rPr lang="pt-BR" sz="1200" b="1" i="0" kern="1200" baseline="0" dirty="0" smtClean="0">
                 <a:solidFill>
                   <a:schemeClr val="tx1"/>
                 </a:solidFill>
@@ -1008,7 +1107,7 @@
                 <a:ea typeface="+mn-ea"/>
                 <a:cs typeface="+mn-cs"/>
               </a:rPr>
-              <a:t>Informações sobre a empresa desenvolvedora, tais como contatos e etc.</a:t>
+              <a:t>Rodapé:</a:t>
             </a:r>
           </a:p>
           <a:p>
@@ -1039,6 +1138,37 @@
                 <a:ea typeface="+mn-ea"/>
                 <a:cs typeface="+mn-cs"/>
               </a:rPr>
+              <a:t>Informações sobre a empresa desenvolvedora, tais como contatos e etc.</a:t>
+            </a:r>
+          </a:p>
+          <a:p>
+            <a:pPr marL="0" marR="0" indent="0" algn="l" defTabSz="914400" rtl="0" eaLnBrk="1" fontAlgn="auto" latinLnBrk="0" hangingPunct="1">
+              <a:lnSpc>
+                <a:spcPct val="100000"/>
+              </a:lnSpc>
+              <a:spcBef>
+                <a:spcPts val="0"/>
+              </a:spcBef>
+              <a:spcAft>
+                <a:spcPts val="0"/>
+              </a:spcAft>
+              <a:buClrTx/>
+              <a:buSzTx/>
+              <a:buFontTx/>
+              <a:buNone/>
+              <a:tabLst/>
+              <a:defRPr/>
+            </a:pPr>
+            <a:r>
+              <a:rPr lang="pt-BR" sz="1200" b="0" i="0" kern="1200" dirty="0" smtClean="0">
+                <a:solidFill>
+                  <a:schemeClr val="tx1"/>
+                </a:solidFill>
+                <a:effectLst/>
+                <a:latin typeface="+mn-lt"/>
+                <a:ea typeface="+mn-ea"/>
+                <a:cs typeface="+mn-cs"/>
+              </a:rPr>
               <a:t>Informações sobre a empresa cliente do sistema.</a:t>
             </a:r>
           </a:p>
@@ -1061,7 +1191,7 @@
           <a:p>
             <a:fld id="{97E31263-D404-4F6F-81C3-433A5ED169C5}" type="slidenum">
               <a:rPr lang="pt-BR" smtClean="0"/>
-              <a:t>3</a:t>
+              <a:t>4</a:t>
             </a:fld>
             <a:endParaRPr lang="pt-BR" dirty="0"/>
           </a:p>
@@ -1071,6 +1201,90 @@
     <p:extLst>
       <p:ext uri="{BB962C8B-B14F-4D97-AF65-F5344CB8AC3E}">
         <p14:creationId xmlns:p14="http://schemas.microsoft.com/office/powerpoint/2010/main" val="1393650944"/>
+      </p:ext>
+    </p:extLst>
+  </p:cSld>
+  <p:clrMapOvr>
+    <a:masterClrMapping/>
+  </p:clrMapOvr>
+</p:notes>
+</file>
+
+<file path=ppt/notesSlides/notesSlide3.xml><?xml version="1.0" encoding="utf-8"?>
+<p:notes xmlns:a="http://schemas.openxmlformats.org/drawingml/2006/main" xmlns:r="http://schemas.openxmlformats.org/officeDocument/2006/relationships" xmlns:p="http://schemas.openxmlformats.org/presentationml/2006/main">
+  <p:cSld>
+    <p:spTree>
+      <p:nvGrpSpPr>
+        <p:cNvPr id="1" name=""/>
+        <p:cNvGrpSpPr/>
+        <p:nvPr/>
+      </p:nvGrpSpPr>
+      <p:grpSpPr>
+        <a:xfrm>
+          <a:off x="0" y="0"/>
+          <a:ext cx="0" cy="0"/>
+          <a:chOff x="0" y="0"/>
+          <a:chExt cx="0" cy="0"/>
+        </a:xfrm>
+      </p:grpSpPr>
+      <p:sp>
+        <p:nvSpPr>
+          <p:cNvPr id="2" name="Espaço Reservado para Imagem de Slide 1"/>
+          <p:cNvSpPr>
+            <a:spLocks noGrp="1" noRot="1" noChangeAspect="1"/>
+          </p:cNvSpPr>
+          <p:nvPr>
+            <p:ph type="sldImg"/>
+          </p:nvPr>
+        </p:nvSpPr>
+        <p:spPr/>
+      </p:sp>
+      <p:sp>
+        <p:nvSpPr>
+          <p:cNvPr id="3" name="Espaço Reservado para Anotações 2"/>
+          <p:cNvSpPr>
+            <a:spLocks noGrp="1"/>
+          </p:cNvSpPr>
+          <p:nvPr>
+            <p:ph type="body" idx="1"/>
+          </p:nvPr>
+        </p:nvSpPr>
+        <p:spPr/>
+        <p:txBody>
+          <a:bodyPr/>
+          <a:lstStyle/>
+          <a:p>
+            <a:endParaRPr lang="pt-BR" dirty="0"/>
+          </a:p>
+        </p:txBody>
+      </p:sp>
+      <p:sp>
+        <p:nvSpPr>
+          <p:cNvPr id="4" name="Espaço Reservado para Número de Slide 3"/>
+          <p:cNvSpPr>
+            <a:spLocks noGrp="1"/>
+          </p:cNvSpPr>
+          <p:nvPr>
+            <p:ph type="sldNum" sz="quarter" idx="10"/>
+          </p:nvPr>
+        </p:nvSpPr>
+        <p:spPr/>
+        <p:txBody>
+          <a:bodyPr/>
+          <a:lstStyle/>
+          <a:p>
+            <a:fld id="{97E31263-D404-4F6F-81C3-433A5ED169C5}" type="slidenum">
+              <a:rPr lang="pt-BR" smtClean="0"/>
+              <a:t>5</a:t>
+            </a:fld>
+            <a:endParaRPr lang="pt-BR" dirty="0"/>
+          </a:p>
+        </p:txBody>
+      </p:sp>
+    </p:spTree>
+    <p:extLst>
+      <p:ext uri="{BB962C8B-B14F-4D97-AF65-F5344CB8AC3E}">
+        <p14:creationId xmlns:p14="http://schemas.microsoft.com/office/powerpoint/2010/main" val="4021740438"/>
       </p:ext>
     </p:extLst>
   </p:cSld>
@@ -1261,7 +1475,7 @@
           <a:p>
             <a:fld id="{44B8A51E-3842-4EAC-866C-3A2CB7D1A4DA}" type="datetimeFigureOut">
               <a:rPr lang="pt-BR" smtClean="0"/>
-              <a:t>31/05/2023</a:t>
+              <a:t>01/06/2023</a:t>
             </a:fld>
             <a:endParaRPr lang="pt-BR" dirty="0"/>
           </a:p>
@@ -1431,7 +1645,7 @@
           <a:p>
             <a:fld id="{44B8A51E-3842-4EAC-866C-3A2CB7D1A4DA}" type="datetimeFigureOut">
               <a:rPr lang="pt-BR" smtClean="0"/>
-              <a:t>31/05/2023</a:t>
+              <a:t>01/06/2023</a:t>
             </a:fld>
             <a:endParaRPr lang="pt-BR" dirty="0"/>
           </a:p>
@@ -1611,7 +1825,7 @@
           <a:p>
             <a:fld id="{44B8A51E-3842-4EAC-866C-3A2CB7D1A4DA}" type="datetimeFigureOut">
               <a:rPr lang="pt-BR" smtClean="0"/>
-              <a:t>31/05/2023</a:t>
+              <a:t>01/06/2023</a:t>
             </a:fld>
             <a:endParaRPr lang="pt-BR" dirty="0"/>
           </a:p>
@@ -1781,7 +1995,7 @@
           <a:p>
             <a:fld id="{44B8A51E-3842-4EAC-866C-3A2CB7D1A4DA}" type="datetimeFigureOut">
               <a:rPr lang="pt-BR" smtClean="0"/>
-              <a:t>31/05/2023</a:t>
+              <a:t>01/06/2023</a:t>
             </a:fld>
             <a:endParaRPr lang="pt-BR" dirty="0"/>
           </a:p>
@@ -2027,7 +2241,7 @@
           <a:p>
             <a:fld id="{44B8A51E-3842-4EAC-866C-3A2CB7D1A4DA}" type="datetimeFigureOut">
               <a:rPr lang="pt-BR" smtClean="0"/>
-              <a:t>31/05/2023</a:t>
+              <a:t>01/06/2023</a:t>
             </a:fld>
             <a:endParaRPr lang="pt-BR" dirty="0"/>
           </a:p>
@@ -2315,7 +2529,7 @@
           <a:p>
             <a:fld id="{44B8A51E-3842-4EAC-866C-3A2CB7D1A4DA}" type="datetimeFigureOut">
               <a:rPr lang="pt-BR" smtClean="0"/>
-              <a:t>31/05/2023</a:t>
+              <a:t>01/06/2023</a:t>
             </a:fld>
             <a:endParaRPr lang="pt-BR" dirty="0"/>
           </a:p>
@@ -2737,7 +2951,7 @@
           <a:p>
             <a:fld id="{44B8A51E-3842-4EAC-866C-3A2CB7D1A4DA}" type="datetimeFigureOut">
               <a:rPr lang="pt-BR" smtClean="0"/>
-              <a:t>31/05/2023</a:t>
+              <a:t>01/06/2023</a:t>
             </a:fld>
             <a:endParaRPr lang="pt-BR" dirty="0"/>
           </a:p>
@@ -2855,7 +3069,7 @@
           <a:p>
             <a:fld id="{44B8A51E-3842-4EAC-866C-3A2CB7D1A4DA}" type="datetimeFigureOut">
               <a:rPr lang="pt-BR" smtClean="0"/>
-              <a:t>31/05/2023</a:t>
+              <a:t>01/06/2023</a:t>
             </a:fld>
             <a:endParaRPr lang="pt-BR" dirty="0"/>
           </a:p>
@@ -2950,7 +3164,7 @@
           <a:p>
             <a:fld id="{44B8A51E-3842-4EAC-866C-3A2CB7D1A4DA}" type="datetimeFigureOut">
               <a:rPr lang="pt-BR" smtClean="0"/>
-              <a:t>31/05/2023</a:t>
+              <a:t>01/06/2023</a:t>
             </a:fld>
             <a:endParaRPr lang="pt-BR" dirty="0"/>
           </a:p>
@@ -3234,7 +3448,7 @@
           <a:p>
             <a:fld id="{44B8A51E-3842-4EAC-866C-3A2CB7D1A4DA}" type="datetimeFigureOut">
               <a:rPr lang="pt-BR" smtClean="0"/>
-              <a:t>31/05/2023</a:t>
+              <a:t>01/06/2023</a:t>
             </a:fld>
             <a:endParaRPr lang="pt-BR" dirty="0"/>
           </a:p>
@@ -3487,7 +3701,7 @@
           <a:p>
             <a:fld id="{44B8A51E-3842-4EAC-866C-3A2CB7D1A4DA}" type="datetimeFigureOut">
               <a:rPr lang="pt-BR" smtClean="0"/>
-              <a:t>31/05/2023</a:t>
+              <a:t>01/06/2023</a:t>
             </a:fld>
             <a:endParaRPr lang="pt-BR" dirty="0"/>
           </a:p>
@@ -3700,7 +3914,7 @@
           <a:p>
             <a:fld id="{44B8A51E-3842-4EAC-866C-3A2CB7D1A4DA}" type="datetimeFigureOut">
               <a:rPr lang="pt-BR" smtClean="0"/>
-              <a:t>31/05/2023</a:t>
+              <a:t>01/06/2023</a:t>
             </a:fld>
             <a:endParaRPr lang="pt-BR" dirty="0"/>
           </a:p>
@@ -4294,14 +4508,15 @@
           <a:p>
             <a:r>
               <a:rPr lang="pt-BR" dirty="0" smtClean="0"/>
-              <a:t>Na tela de Login, constar a logo do sistema ERP.</a:t>
-            </a:r>
-            <a:br>
+              <a:t>Na tela de </a:t>
+            </a:r>
+            <a:r>
               <a:rPr lang="pt-BR" dirty="0" smtClean="0"/>
-            </a:br>
+              <a:t>Área do Cliente(login), só </a:t>
+            </a:r>
             <a:r>
               <a:rPr lang="pt-BR" dirty="0" smtClean="0"/>
-              <a:t>Só constar os campos CPF e senha. Caso o CPF informado pertença à uma rede, um novo campo para informar em qual filial irá logar-se será apresentado.</a:t>
+              <a:t>constar os campos CPF e senha. Caso o CPF informado pertença à uma rede, um novo campo para informar em qual filial irá logar-se será apresentado.</a:t>
             </a:r>
           </a:p>
           <a:p>
@@ -4313,7 +4528,15 @@
           <a:p>
             <a:r>
               <a:rPr lang="pt-BR" dirty="0" smtClean="0"/>
-              <a:t>Acrescentar “Voltar à tela anterior”, ”Recuperar senha” e informação de alerta caso tenha informado usuário e/ou senha errado.</a:t>
+              <a:t>Acrescentar </a:t>
+            </a:r>
+            <a:r>
+              <a:rPr lang="pt-BR" dirty="0" smtClean="0"/>
+              <a:t>”Esqueci minha </a:t>
+            </a:r>
+            <a:r>
+              <a:rPr lang="pt-BR" dirty="0" smtClean="0"/>
+              <a:t>senha” e informação de alerta caso tenha informado usuário e/ou senha errado.</a:t>
             </a:r>
             <a:endParaRPr lang="pt-BR" dirty="0"/>
           </a:p>
@@ -4356,16 +4579,46 @@
           <a:chExt cx="0" cy="0"/>
         </a:xfrm>
       </p:grpSpPr>
-      <p:sp>
-        <p:nvSpPr>
-          <p:cNvPr id="2" name="CaixaDeTexto 1"/>
+      <p:pic>
+        <p:nvPicPr>
+          <p:cNvPr id="3" name="Imagem 2"/>
+          <p:cNvPicPr>
+            <a:picLocks noChangeAspect="1"/>
+          </p:cNvPicPr>
+          <p:nvPr/>
+        </p:nvPicPr>
+        <p:blipFill>
+          <a:blip r:embed="rId2">
+            <a:extLst>
+              <a:ext uri="{28A0092B-C50C-407E-A947-70E740481C1C}">
+                <a14:useLocalDpi xmlns:a14="http://schemas.microsoft.com/office/drawing/2010/main" val="0"/>
+              </a:ext>
+            </a:extLst>
+          </a:blip>
+          <a:stretch>
+            <a:fillRect/>
+          </a:stretch>
+        </p:blipFill>
+        <p:spPr>
+          <a:xfrm>
+            <a:off x="0" y="-27384"/>
+            <a:ext cx="9144000" cy="4746044"/>
+          </a:xfrm>
+          <a:prstGeom prst="rect">
+            <a:avLst/>
+          </a:prstGeom>
+        </p:spPr>
+      </p:pic>
+      <p:sp>
+        <p:nvSpPr>
+          <p:cNvPr id="4" name="CaixaDeTexto 3"/>
           <p:cNvSpPr txBox="1"/>
           <p:nvPr/>
         </p:nvSpPr>
         <p:spPr>
           <a:xfrm>
-            <a:off x="6422" y="-27384"/>
-            <a:ext cx="2405338" cy="369332"/>
+            <a:off x="35496" y="5518973"/>
+            <a:ext cx="9001000" cy="369332"/>
           </a:xfrm>
           <a:prstGeom prst="rect">
             <a:avLst/>
@@ -4373,196 +4626,6 @@
           <a:noFill/>
         </p:spPr>
         <p:txBody>
-          <a:bodyPr wrap="none" rtlCol="0">
-            <a:spAutoFit/>
-          </a:bodyPr>
-          <a:lstStyle/>
-          <a:p>
-            <a:r>
-              <a:rPr lang="pt-BR" dirty="0" smtClean="0"/>
-              <a:t>Layout geral do Sistema</a:t>
-            </a:r>
-            <a:endParaRPr lang="pt-BR" dirty="0"/>
-          </a:p>
-        </p:txBody>
-      </p:sp>
-      <p:sp>
-        <p:nvSpPr>
-          <p:cNvPr id="3" name="Retângulo 2"/>
-          <p:cNvSpPr/>
-          <p:nvPr/>
-        </p:nvSpPr>
-        <p:spPr>
-          <a:xfrm>
-            <a:off x="6422" y="341948"/>
-            <a:ext cx="9137578" cy="782796"/>
-          </a:xfrm>
-          <a:prstGeom prst="rect">
-            <a:avLst/>
-          </a:prstGeom>
-        </p:spPr>
-        <p:style>
-          <a:lnRef idx="2">
-            <a:schemeClr val="accent1">
-              <a:shade val="50000"/>
-            </a:schemeClr>
-          </a:lnRef>
-          <a:fillRef idx="1">
-            <a:schemeClr val="accent1"/>
-          </a:fillRef>
-          <a:effectRef idx="0">
-            <a:schemeClr val="accent1"/>
-          </a:effectRef>
-          <a:fontRef idx="minor">
-            <a:schemeClr val="lt1"/>
-          </a:fontRef>
-        </p:style>
-        <p:txBody>
-          <a:bodyPr rtlCol="0" anchor="ctr"/>
-          <a:lstStyle/>
-          <a:p>
-            <a:pPr algn="ctr"/>
-            <a:endParaRPr lang="pt-BR"/>
-          </a:p>
-        </p:txBody>
-      </p:sp>
-      <p:sp>
-        <p:nvSpPr>
-          <p:cNvPr id="5" name="Retângulo 4"/>
-          <p:cNvSpPr/>
-          <p:nvPr/>
-        </p:nvSpPr>
-        <p:spPr>
-          <a:xfrm>
-            <a:off x="6422" y="6381328"/>
-            <a:ext cx="9137578" cy="476672"/>
-          </a:xfrm>
-          <a:prstGeom prst="rect">
-            <a:avLst/>
-          </a:prstGeom>
-        </p:spPr>
-        <p:style>
-          <a:lnRef idx="2">
-            <a:schemeClr val="accent1">
-              <a:shade val="50000"/>
-            </a:schemeClr>
-          </a:lnRef>
-          <a:fillRef idx="1">
-            <a:schemeClr val="accent1"/>
-          </a:fillRef>
-          <a:effectRef idx="0">
-            <a:schemeClr val="accent1"/>
-          </a:effectRef>
-          <a:fontRef idx="minor">
-            <a:schemeClr val="lt1"/>
-          </a:fontRef>
-        </p:style>
-        <p:txBody>
-          <a:bodyPr rtlCol="0" anchor="ctr"/>
-          <a:lstStyle/>
-          <a:p>
-            <a:pPr algn="ctr"/>
-            <a:endParaRPr lang="pt-BR"/>
-          </a:p>
-        </p:txBody>
-      </p:sp>
-      <p:sp>
-        <p:nvSpPr>
-          <p:cNvPr id="6" name="Retângulo 5"/>
-          <p:cNvSpPr/>
-          <p:nvPr/>
-        </p:nvSpPr>
-        <p:spPr>
-          <a:xfrm>
-            <a:off x="6422" y="1196752"/>
-            <a:ext cx="1037186" cy="5112568"/>
-          </a:xfrm>
-          <a:prstGeom prst="rect">
-            <a:avLst/>
-          </a:prstGeom>
-        </p:spPr>
-        <p:style>
-          <a:lnRef idx="2">
-            <a:schemeClr val="accent1">
-              <a:shade val="50000"/>
-            </a:schemeClr>
-          </a:lnRef>
-          <a:fillRef idx="1">
-            <a:schemeClr val="accent1"/>
-          </a:fillRef>
-          <a:effectRef idx="0">
-            <a:schemeClr val="accent1"/>
-          </a:effectRef>
-          <a:fontRef idx="minor">
-            <a:schemeClr val="lt1"/>
-          </a:fontRef>
-        </p:style>
-        <p:txBody>
-          <a:bodyPr rtlCol="0" anchor="ctr"/>
-          <a:lstStyle/>
-          <a:p>
-            <a:pPr algn="ctr"/>
-            <a:endParaRPr lang="pt-BR"/>
-          </a:p>
-        </p:txBody>
-      </p:sp>
-      <p:sp>
-        <p:nvSpPr>
-          <p:cNvPr id="7" name="Retângulo 6"/>
-          <p:cNvSpPr/>
-          <p:nvPr/>
-        </p:nvSpPr>
-        <p:spPr>
-          <a:xfrm>
-            <a:off x="1115616" y="1196752"/>
-            <a:ext cx="7934909" cy="5112568"/>
-          </a:xfrm>
-          <a:prstGeom prst="rect">
-            <a:avLst/>
-          </a:prstGeom>
-        </p:spPr>
-        <p:style>
-          <a:lnRef idx="2">
-            <a:schemeClr val="accent1">
-              <a:shade val="50000"/>
-            </a:schemeClr>
-          </a:lnRef>
-          <a:fillRef idx="1">
-            <a:schemeClr val="accent1"/>
-          </a:fillRef>
-          <a:effectRef idx="0">
-            <a:schemeClr val="accent1"/>
-          </a:effectRef>
-          <a:fontRef idx="minor">
-            <a:schemeClr val="lt1"/>
-          </a:fontRef>
-        </p:style>
-        <p:txBody>
-          <a:bodyPr rtlCol="0" anchor="ctr"/>
-          <a:lstStyle/>
-          <a:p>
-            <a:pPr algn="ctr"/>
-            <a:endParaRPr lang="pt-BR"/>
-          </a:p>
-        </p:txBody>
-      </p:sp>
-      <p:sp>
-        <p:nvSpPr>
-          <p:cNvPr id="8" name="CaixaDeTexto 7"/>
-          <p:cNvSpPr txBox="1"/>
-          <p:nvPr/>
-        </p:nvSpPr>
-        <p:spPr>
-          <a:xfrm>
-            <a:off x="3131840" y="548680"/>
-            <a:ext cx="2664296" cy="461665"/>
-          </a:xfrm>
-          <a:prstGeom prst="rect">
-            <a:avLst/>
-          </a:prstGeom>
-          <a:noFill/>
-        </p:spPr>
-        <p:txBody>
           <a:bodyPr wrap="square" rtlCol="0">
             <a:spAutoFit/>
           </a:bodyPr>
@@ -4570,193 +4633,17 @@
           <a:p>
             <a:pPr algn="ctr"/>
             <a:r>
-              <a:rPr lang="pt-PT" sz="2400" b="1" dirty="0" smtClean="0">
-                <a:solidFill>
-                  <a:schemeClr val="bg1"/>
-                </a:solidFill>
-              </a:rPr>
-              <a:t>CABEÇALHO</a:t>
-            </a:r>
-            <a:r>
-              <a:rPr lang="pt-PT" sz="1600" b="1" dirty="0" smtClean="0">
-                <a:solidFill>
-                  <a:schemeClr val="bg1"/>
-                </a:solidFill>
-              </a:rPr>
-              <a:t>(fixo)</a:t>
-            </a:r>
-            <a:endParaRPr lang="pt-BR" sz="2400" b="1" dirty="0">
-              <a:solidFill>
-                <a:schemeClr val="bg1"/>
-              </a:solidFill>
-            </a:endParaRPr>
-          </a:p>
-        </p:txBody>
-      </p:sp>
-      <p:sp>
-        <p:nvSpPr>
-          <p:cNvPr id="9" name="CaixaDeTexto 8"/>
-          <p:cNvSpPr txBox="1"/>
-          <p:nvPr/>
-        </p:nvSpPr>
-        <p:spPr>
-          <a:xfrm>
-            <a:off x="3059832" y="3284984"/>
-            <a:ext cx="2664296" cy="707886"/>
-          </a:xfrm>
-          <a:prstGeom prst="rect">
-            <a:avLst/>
-          </a:prstGeom>
-          <a:noFill/>
-        </p:spPr>
-        <p:txBody>
-          <a:bodyPr wrap="square" rtlCol="0">
-            <a:spAutoFit/>
-          </a:bodyPr>
-          <a:lstStyle/>
-          <a:p>
-            <a:pPr algn="ctr"/>
-            <a:r>
-              <a:rPr lang="pt-PT" sz="2400" b="1" dirty="0" smtClean="0">
-                <a:solidFill>
-                  <a:schemeClr val="bg1"/>
-                </a:solidFill>
-              </a:rPr>
-              <a:t>CONTEÚDO</a:t>
-            </a:r>
-            <a:endParaRPr lang="pt-PT" sz="1600" b="1" dirty="0" smtClean="0">
-              <a:solidFill>
-                <a:schemeClr val="bg1"/>
-              </a:solidFill>
-            </a:endParaRPr>
-          </a:p>
-          <a:p>
-            <a:pPr algn="ctr"/>
-            <a:r>
-              <a:rPr lang="pt-PT" sz="1600" b="1" dirty="0" smtClean="0">
-                <a:solidFill>
-                  <a:schemeClr val="bg1"/>
-                </a:solidFill>
-              </a:rPr>
-              <a:t>(mínimo scrolável)</a:t>
-            </a:r>
-            <a:endParaRPr lang="pt-BR" sz="2400" b="1" dirty="0">
-              <a:solidFill>
-                <a:schemeClr val="bg1"/>
-              </a:solidFill>
-            </a:endParaRPr>
-          </a:p>
-        </p:txBody>
-      </p:sp>
-      <p:sp>
-        <p:nvSpPr>
-          <p:cNvPr id="10" name="CaixaDeTexto 9"/>
-          <p:cNvSpPr txBox="1"/>
-          <p:nvPr/>
-        </p:nvSpPr>
-        <p:spPr>
-          <a:xfrm>
-            <a:off x="3059832" y="6351711"/>
-            <a:ext cx="2664296" cy="461665"/>
-          </a:xfrm>
-          <a:prstGeom prst="rect">
-            <a:avLst/>
-          </a:prstGeom>
-          <a:noFill/>
-        </p:spPr>
-        <p:txBody>
-          <a:bodyPr wrap="square" rtlCol="0">
-            <a:spAutoFit/>
-          </a:bodyPr>
-          <a:lstStyle/>
-          <a:p>
-            <a:pPr algn="ctr"/>
-            <a:r>
-              <a:rPr lang="pt-PT" sz="2400" b="1" dirty="0" smtClean="0">
-                <a:solidFill>
-                  <a:schemeClr val="bg1"/>
-                </a:solidFill>
-              </a:rPr>
-              <a:t>RODAPÉ</a:t>
-            </a:r>
-            <a:r>
-              <a:rPr lang="pt-PT" sz="1400" b="1" dirty="0" smtClean="0">
-                <a:solidFill>
-                  <a:schemeClr val="bg1"/>
-                </a:solidFill>
-              </a:rPr>
-              <a:t>(fixo)</a:t>
-            </a:r>
-            <a:endParaRPr lang="pt-BR" sz="2400" b="1" dirty="0">
-              <a:solidFill>
-                <a:schemeClr val="bg1"/>
-              </a:solidFill>
-            </a:endParaRPr>
-          </a:p>
-        </p:txBody>
-      </p:sp>
-      <p:sp>
-        <p:nvSpPr>
-          <p:cNvPr id="11" name="CaixaDeTexto 10"/>
-          <p:cNvSpPr txBox="1"/>
-          <p:nvPr/>
-        </p:nvSpPr>
-        <p:spPr>
-          <a:xfrm>
-            <a:off x="-36512" y="3284984"/>
-            <a:ext cx="1080120" cy="1200329"/>
-          </a:xfrm>
-          <a:prstGeom prst="rect">
-            <a:avLst/>
-          </a:prstGeom>
-          <a:noFill/>
-        </p:spPr>
-        <p:txBody>
-          <a:bodyPr wrap="square" rtlCol="0">
-            <a:spAutoFit/>
-          </a:bodyPr>
-          <a:lstStyle/>
-          <a:p>
-            <a:pPr algn="ctr"/>
-            <a:r>
-              <a:rPr lang="pt-PT" sz="2400" b="1" dirty="0" smtClean="0">
-                <a:solidFill>
-                  <a:schemeClr val="bg1"/>
-                </a:solidFill>
-              </a:rPr>
-              <a:t>MENU</a:t>
-            </a:r>
-          </a:p>
-          <a:p>
-            <a:pPr algn="ctr"/>
-            <a:r>
-              <a:rPr lang="pt-PT" sz="1600" b="1" dirty="0" smtClean="0">
-                <a:solidFill>
-                  <a:schemeClr val="bg1"/>
-                </a:solidFill>
-              </a:rPr>
-              <a:t>(</a:t>
-            </a:r>
-            <a:r>
-              <a:rPr lang="pt-PT" sz="1600" b="1" dirty="0" smtClean="0">
-                <a:solidFill>
-                  <a:schemeClr val="bg1"/>
-                </a:solidFill>
-              </a:rPr>
-              <a:t>ocultável e mínimo scrolável)</a:t>
-            </a:r>
-            <a:endParaRPr lang="pt-BR" sz="2400" b="1" dirty="0">
-              <a:solidFill>
-                <a:schemeClr val="bg1"/>
-              </a:solidFill>
-            </a:endParaRPr>
+              <a:rPr lang="pt-BR" dirty="0" smtClean="0"/>
+              <a:t>Nova tela de Área do Cliente , também conhecida como login.</a:t>
+            </a:r>
+            <a:endParaRPr lang="pt-BR" dirty="0"/>
           </a:p>
         </p:txBody>
       </p:sp>
     </p:spTree>
     <p:extLst>
       <p:ext uri="{BB962C8B-B14F-4D97-AF65-F5344CB8AC3E}">
-        <p14:creationId xmlns:p14="http://schemas.microsoft.com/office/powerpoint/2010/main" val="4260029238"/>
+        <p14:creationId xmlns:p14="http://schemas.microsoft.com/office/powerpoint/2010/main" val="2511853939"/>
       </p:ext>
     </p:extLst>
   </p:cSld>
@@ -4783,6 +4670,429 @@
           <a:chExt cx="0" cy="0"/>
         </a:xfrm>
       </p:grpSpPr>
+      <p:sp>
+        <p:nvSpPr>
+          <p:cNvPr id="2" name="CaixaDeTexto 1"/>
+          <p:cNvSpPr txBox="1"/>
+          <p:nvPr/>
+        </p:nvSpPr>
+        <p:spPr>
+          <a:xfrm>
+            <a:off x="6422" y="-27384"/>
+            <a:ext cx="3300968" cy="369332"/>
+          </a:xfrm>
+          <a:prstGeom prst="rect">
+            <a:avLst/>
+          </a:prstGeom>
+          <a:noFill/>
+        </p:spPr>
+        <p:txBody>
+          <a:bodyPr wrap="none" rtlCol="0">
+            <a:spAutoFit/>
+          </a:bodyPr>
+          <a:lstStyle/>
+          <a:p>
+            <a:r>
+              <a:rPr lang="pt-BR" dirty="0" smtClean="0"/>
+              <a:t>Layout geral do </a:t>
+            </a:r>
+            <a:r>
+              <a:rPr lang="pt-BR" dirty="0" smtClean="0"/>
+              <a:t>Sistema ERP Web</a:t>
+            </a:r>
+            <a:endParaRPr lang="pt-BR" dirty="0"/>
+          </a:p>
+        </p:txBody>
+      </p:sp>
+      <p:sp>
+        <p:nvSpPr>
+          <p:cNvPr id="3" name="Retângulo 2"/>
+          <p:cNvSpPr/>
+          <p:nvPr/>
+        </p:nvSpPr>
+        <p:spPr>
+          <a:xfrm>
+            <a:off x="6422" y="341948"/>
+            <a:ext cx="9137578" cy="782796"/>
+          </a:xfrm>
+          <a:prstGeom prst="rect">
+            <a:avLst/>
+          </a:prstGeom>
+        </p:spPr>
+        <p:style>
+          <a:lnRef idx="2">
+            <a:schemeClr val="accent1">
+              <a:shade val="50000"/>
+            </a:schemeClr>
+          </a:lnRef>
+          <a:fillRef idx="1">
+            <a:schemeClr val="accent1"/>
+          </a:fillRef>
+          <a:effectRef idx="0">
+            <a:schemeClr val="accent1"/>
+          </a:effectRef>
+          <a:fontRef idx="minor">
+            <a:schemeClr val="lt1"/>
+          </a:fontRef>
+        </p:style>
+        <p:txBody>
+          <a:bodyPr rtlCol="0" anchor="ctr"/>
+          <a:lstStyle/>
+          <a:p>
+            <a:pPr algn="ctr"/>
+            <a:endParaRPr lang="pt-BR"/>
+          </a:p>
+        </p:txBody>
+      </p:sp>
+      <p:sp>
+        <p:nvSpPr>
+          <p:cNvPr id="5" name="Retângulo 4"/>
+          <p:cNvSpPr/>
+          <p:nvPr/>
+        </p:nvSpPr>
+        <p:spPr>
+          <a:xfrm>
+            <a:off x="6422" y="6381328"/>
+            <a:ext cx="9137578" cy="476672"/>
+          </a:xfrm>
+          <a:prstGeom prst="rect">
+            <a:avLst/>
+          </a:prstGeom>
+        </p:spPr>
+        <p:style>
+          <a:lnRef idx="2">
+            <a:schemeClr val="accent1">
+              <a:shade val="50000"/>
+            </a:schemeClr>
+          </a:lnRef>
+          <a:fillRef idx="1">
+            <a:schemeClr val="accent1"/>
+          </a:fillRef>
+          <a:effectRef idx="0">
+            <a:schemeClr val="accent1"/>
+          </a:effectRef>
+          <a:fontRef idx="minor">
+            <a:schemeClr val="lt1"/>
+          </a:fontRef>
+        </p:style>
+        <p:txBody>
+          <a:bodyPr rtlCol="0" anchor="ctr"/>
+          <a:lstStyle/>
+          <a:p>
+            <a:pPr algn="ctr"/>
+            <a:endParaRPr lang="pt-BR"/>
+          </a:p>
+        </p:txBody>
+      </p:sp>
+      <p:sp>
+        <p:nvSpPr>
+          <p:cNvPr id="6" name="Retângulo 5"/>
+          <p:cNvSpPr/>
+          <p:nvPr/>
+        </p:nvSpPr>
+        <p:spPr>
+          <a:xfrm>
+            <a:off x="6422" y="1196752"/>
+            <a:ext cx="1037186" cy="5112568"/>
+          </a:xfrm>
+          <a:prstGeom prst="rect">
+            <a:avLst/>
+          </a:prstGeom>
+        </p:spPr>
+        <p:style>
+          <a:lnRef idx="2">
+            <a:schemeClr val="accent1">
+              <a:shade val="50000"/>
+            </a:schemeClr>
+          </a:lnRef>
+          <a:fillRef idx="1">
+            <a:schemeClr val="accent1"/>
+          </a:fillRef>
+          <a:effectRef idx="0">
+            <a:schemeClr val="accent1"/>
+          </a:effectRef>
+          <a:fontRef idx="minor">
+            <a:schemeClr val="lt1"/>
+          </a:fontRef>
+        </p:style>
+        <p:txBody>
+          <a:bodyPr rtlCol="0" anchor="ctr"/>
+          <a:lstStyle/>
+          <a:p>
+            <a:pPr algn="ctr"/>
+            <a:endParaRPr lang="pt-BR"/>
+          </a:p>
+        </p:txBody>
+      </p:sp>
+      <p:sp>
+        <p:nvSpPr>
+          <p:cNvPr id="7" name="Retângulo 6"/>
+          <p:cNvSpPr/>
+          <p:nvPr/>
+        </p:nvSpPr>
+        <p:spPr>
+          <a:xfrm>
+            <a:off x="1115616" y="1196752"/>
+            <a:ext cx="7934909" cy="5112568"/>
+          </a:xfrm>
+          <a:prstGeom prst="rect">
+            <a:avLst/>
+          </a:prstGeom>
+        </p:spPr>
+        <p:style>
+          <a:lnRef idx="2">
+            <a:schemeClr val="accent1">
+              <a:shade val="50000"/>
+            </a:schemeClr>
+          </a:lnRef>
+          <a:fillRef idx="1">
+            <a:schemeClr val="accent1"/>
+          </a:fillRef>
+          <a:effectRef idx="0">
+            <a:schemeClr val="accent1"/>
+          </a:effectRef>
+          <a:fontRef idx="minor">
+            <a:schemeClr val="lt1"/>
+          </a:fontRef>
+        </p:style>
+        <p:txBody>
+          <a:bodyPr rtlCol="0" anchor="ctr"/>
+          <a:lstStyle/>
+          <a:p>
+            <a:pPr algn="ctr"/>
+            <a:endParaRPr lang="pt-BR"/>
+          </a:p>
+        </p:txBody>
+      </p:sp>
+      <p:sp>
+        <p:nvSpPr>
+          <p:cNvPr id="8" name="CaixaDeTexto 7"/>
+          <p:cNvSpPr txBox="1"/>
+          <p:nvPr/>
+        </p:nvSpPr>
+        <p:spPr>
+          <a:xfrm>
+            <a:off x="3131840" y="548680"/>
+            <a:ext cx="2664296" cy="461665"/>
+          </a:xfrm>
+          <a:prstGeom prst="rect">
+            <a:avLst/>
+          </a:prstGeom>
+          <a:noFill/>
+        </p:spPr>
+        <p:txBody>
+          <a:bodyPr wrap="square" rtlCol="0">
+            <a:spAutoFit/>
+          </a:bodyPr>
+          <a:lstStyle/>
+          <a:p>
+            <a:pPr algn="ctr"/>
+            <a:r>
+              <a:rPr lang="pt-PT" sz="2400" b="1" dirty="0" smtClean="0">
+                <a:solidFill>
+                  <a:schemeClr val="bg1"/>
+                </a:solidFill>
+              </a:rPr>
+              <a:t>CABEÇALHO</a:t>
+            </a:r>
+            <a:r>
+              <a:rPr lang="pt-PT" sz="1600" b="1" dirty="0" smtClean="0">
+                <a:solidFill>
+                  <a:schemeClr val="bg1"/>
+                </a:solidFill>
+              </a:rPr>
+              <a:t>(fixo)</a:t>
+            </a:r>
+            <a:endParaRPr lang="pt-BR" sz="2400" b="1" dirty="0">
+              <a:solidFill>
+                <a:schemeClr val="bg1"/>
+              </a:solidFill>
+            </a:endParaRPr>
+          </a:p>
+        </p:txBody>
+      </p:sp>
+      <p:sp>
+        <p:nvSpPr>
+          <p:cNvPr id="9" name="CaixaDeTexto 8"/>
+          <p:cNvSpPr txBox="1"/>
+          <p:nvPr/>
+        </p:nvSpPr>
+        <p:spPr>
+          <a:xfrm>
+            <a:off x="3059832" y="3284984"/>
+            <a:ext cx="2664296" cy="707886"/>
+          </a:xfrm>
+          <a:prstGeom prst="rect">
+            <a:avLst/>
+          </a:prstGeom>
+          <a:noFill/>
+        </p:spPr>
+        <p:txBody>
+          <a:bodyPr wrap="square" rtlCol="0">
+            <a:spAutoFit/>
+          </a:bodyPr>
+          <a:lstStyle/>
+          <a:p>
+            <a:pPr algn="ctr"/>
+            <a:r>
+              <a:rPr lang="pt-PT" sz="2400" b="1" dirty="0" smtClean="0">
+                <a:solidFill>
+                  <a:schemeClr val="bg1"/>
+                </a:solidFill>
+              </a:rPr>
+              <a:t>CONTEÚDO</a:t>
+            </a:r>
+            <a:endParaRPr lang="pt-PT" sz="1600" b="1" dirty="0" smtClean="0">
+              <a:solidFill>
+                <a:schemeClr val="bg1"/>
+              </a:solidFill>
+            </a:endParaRPr>
+          </a:p>
+          <a:p>
+            <a:pPr algn="ctr"/>
+            <a:r>
+              <a:rPr lang="pt-PT" sz="1600" b="1" dirty="0" smtClean="0">
+                <a:solidFill>
+                  <a:schemeClr val="bg1"/>
+                </a:solidFill>
+              </a:rPr>
+              <a:t>(mínimo scrolável)</a:t>
+            </a:r>
+            <a:endParaRPr lang="pt-BR" sz="2400" b="1" dirty="0">
+              <a:solidFill>
+                <a:schemeClr val="bg1"/>
+              </a:solidFill>
+            </a:endParaRPr>
+          </a:p>
+        </p:txBody>
+      </p:sp>
+      <p:sp>
+        <p:nvSpPr>
+          <p:cNvPr id="10" name="CaixaDeTexto 9"/>
+          <p:cNvSpPr txBox="1"/>
+          <p:nvPr/>
+        </p:nvSpPr>
+        <p:spPr>
+          <a:xfrm>
+            <a:off x="3059832" y="6351711"/>
+            <a:ext cx="2664296" cy="461665"/>
+          </a:xfrm>
+          <a:prstGeom prst="rect">
+            <a:avLst/>
+          </a:prstGeom>
+          <a:noFill/>
+        </p:spPr>
+        <p:txBody>
+          <a:bodyPr wrap="square" rtlCol="0">
+            <a:spAutoFit/>
+          </a:bodyPr>
+          <a:lstStyle/>
+          <a:p>
+            <a:pPr algn="ctr"/>
+            <a:r>
+              <a:rPr lang="pt-PT" sz="2400" b="1" dirty="0" smtClean="0">
+                <a:solidFill>
+                  <a:schemeClr val="bg1"/>
+                </a:solidFill>
+              </a:rPr>
+              <a:t>RODAPÉ</a:t>
+            </a:r>
+            <a:r>
+              <a:rPr lang="pt-PT" sz="1400" b="1" dirty="0" smtClean="0">
+                <a:solidFill>
+                  <a:schemeClr val="bg1"/>
+                </a:solidFill>
+              </a:rPr>
+              <a:t>(fixo)</a:t>
+            </a:r>
+            <a:endParaRPr lang="pt-BR" sz="2400" b="1" dirty="0">
+              <a:solidFill>
+                <a:schemeClr val="bg1"/>
+              </a:solidFill>
+            </a:endParaRPr>
+          </a:p>
+        </p:txBody>
+      </p:sp>
+      <p:sp>
+        <p:nvSpPr>
+          <p:cNvPr id="11" name="CaixaDeTexto 10"/>
+          <p:cNvSpPr txBox="1"/>
+          <p:nvPr/>
+        </p:nvSpPr>
+        <p:spPr>
+          <a:xfrm>
+            <a:off x="-36512" y="3284984"/>
+            <a:ext cx="1080120" cy="1200329"/>
+          </a:xfrm>
+          <a:prstGeom prst="rect">
+            <a:avLst/>
+          </a:prstGeom>
+          <a:noFill/>
+        </p:spPr>
+        <p:txBody>
+          <a:bodyPr wrap="square" rtlCol="0">
+            <a:spAutoFit/>
+          </a:bodyPr>
+          <a:lstStyle/>
+          <a:p>
+            <a:pPr algn="ctr"/>
+            <a:r>
+              <a:rPr lang="pt-PT" sz="2400" b="1" dirty="0" smtClean="0">
+                <a:solidFill>
+                  <a:schemeClr val="bg1"/>
+                </a:solidFill>
+              </a:rPr>
+              <a:t>MENU</a:t>
+            </a:r>
+          </a:p>
+          <a:p>
+            <a:pPr algn="ctr"/>
+            <a:r>
+              <a:rPr lang="pt-PT" sz="1600" b="1" dirty="0" smtClean="0">
+                <a:solidFill>
+                  <a:schemeClr val="bg1"/>
+                </a:solidFill>
+              </a:rPr>
+              <a:t>(ocultável e mínimo scrolável)</a:t>
+            </a:r>
+            <a:endParaRPr lang="pt-BR" sz="2400" b="1" dirty="0">
+              <a:solidFill>
+                <a:schemeClr val="bg1"/>
+              </a:solidFill>
+            </a:endParaRPr>
+          </a:p>
+        </p:txBody>
+      </p:sp>
+    </p:spTree>
+    <p:extLst>
+      <p:ext uri="{BB962C8B-B14F-4D97-AF65-F5344CB8AC3E}">
+        <p14:creationId xmlns:p14="http://schemas.microsoft.com/office/powerpoint/2010/main" val="4260029238"/>
+      </p:ext>
+    </p:extLst>
+  </p:cSld>
+  <p:clrMapOvr>
+    <a:masterClrMapping/>
+  </p:clrMapOvr>
+</p:sld>
+</file>
+
+<file path=ppt/slides/slide5.xml><?xml version="1.0" encoding="utf-8"?>
+<p:sld xmlns:a="http://schemas.openxmlformats.org/drawingml/2006/main" xmlns:r="http://schemas.openxmlformats.org/officeDocument/2006/relationships" xmlns:p="http://schemas.openxmlformats.org/presentationml/2006/main">
+  <p:cSld>
+    <p:spTree>
+      <p:nvGrpSpPr>
+        <p:cNvPr id="1" name=""/>
+        <p:cNvGrpSpPr/>
+        <p:nvPr/>
+      </p:nvGrpSpPr>
+      <p:grpSpPr>
+        <a:xfrm>
+          <a:off x="0" y="0"/>
+          <a:ext cx="0" cy="0"/>
+          <a:chOff x="0" y="0"/>
+          <a:chExt cx="0" cy="0"/>
+        </a:xfrm>
+      </p:grpSpPr>
       <p:pic>
         <p:nvPicPr>
           <p:cNvPr id="3074" name="Picture 2"/>
@@ -4792,7 +5102,7 @@
           <p:nvPr/>
         </p:nvPicPr>
         <p:blipFill>
-          <a:blip r:embed="rId2">
+          <a:blip r:embed="rId3">
             <a:extLst>
               <a:ext uri="{28A0092B-C50C-407E-A947-70E740481C1C}">
                 <a14:useLocalDpi xmlns:a14="http://schemas.microsoft.com/office/drawing/2010/main" val="0"/>
@@ -4932,7 +5242,7 @@
 </p:sld>
 </file>
 
-<file path=ppt/slides/slide5.xml><?xml version="1.0" encoding="utf-8"?>
+<file path=ppt/slides/slide6.xml><?xml version="1.0" encoding="utf-8"?>
 <p:sld xmlns:a="http://schemas.openxmlformats.org/drawingml/2006/main" xmlns:r="http://schemas.openxmlformats.org/officeDocument/2006/relationships" xmlns:p="http://schemas.openxmlformats.org/presentationml/2006/main">
   <p:cSld>
     <p:spTree>

</xml_diff>

<commit_message>
Feito alterações no slide sobre a análise e colocado um template no diretório.
</commit_message>
<xml_diff>
--- a/Projeto ERP WEB/Análise ERP WEB BioSistema.pptx
+++ b/Projeto ERP WEB/Análise ERP WEB BioSistema.pptx
@@ -5,7 +5,7 @@
     <p:sldMasterId id="2147483648" r:id="rId1"/>
   </p:sldMasterIdLst>
   <p:notesMasterIdLst>
-    <p:notesMasterId r:id="rId8"/>
+    <p:notesMasterId r:id="rId9"/>
   </p:notesMasterIdLst>
   <p:sldIdLst>
     <p:sldId id="258" r:id="rId2"/>
@@ -13,7 +13,8 @@
     <p:sldId id="263" r:id="rId4"/>
     <p:sldId id="261" r:id="rId5"/>
     <p:sldId id="260" r:id="rId6"/>
-    <p:sldId id="262" r:id="rId7"/>
+    <p:sldId id="264" r:id="rId7"/>
+    <p:sldId id="262" r:id="rId8"/>
   </p:sldIdLst>
   <p:sldSz cx="9144000" cy="6858000" type="screen4x3"/>
   <p:notesSz cx="6858000" cy="9144000"/>
@@ -197,7 +198,7 @@
           <a:p>
             <a:fld id="{6243CB1A-BA5C-4C34-AC0C-90CC0C1B0E03}" type="datetimeFigureOut">
               <a:rPr lang="pt-BR" smtClean="0"/>
-              <a:t>01/06/2023</a:t>
+              <a:t>02/06/2023</a:t>
             </a:fld>
             <a:endParaRPr lang="pt-BR" dirty="0"/>
           </a:p>
@@ -662,11 +663,7 @@
           <a:p>
             <a:r>
               <a:rPr lang="pt-BR" baseline="0" dirty="0" smtClean="0"/>
-              <a:t>-</a:t>
-            </a:r>
-            <a:r>
-              <a:rPr lang="pt-BR" baseline="0" dirty="0" smtClean="0"/>
-              <a:t>Alertas / notificações</a:t>
+              <a:t>-Alertas / notificações</a:t>
             </a:r>
           </a:p>
           <a:p>
@@ -762,19 +759,7 @@
                 <a:ea typeface="+mn-ea"/>
                 <a:cs typeface="+mn-cs"/>
               </a:rPr>
-              <a:t>-Ter somente os módulos </a:t>
-            </a:r>
-            <a:r>
-              <a:rPr lang="pt-BR" sz="1200" b="0" i="0" kern="1200" dirty="0" smtClean="0">
-                <a:solidFill>
-                  <a:schemeClr val="tx1"/>
-                </a:solidFill>
-                <a:effectLst/>
-                <a:latin typeface="+mn-lt"/>
-                <a:ea typeface="+mn-ea"/>
-                <a:cs typeface="+mn-cs"/>
-              </a:rPr>
-              <a:t>de</a:t>
+              <a:t>-Ter somente os módulos de</a:t>
             </a:r>
             <a:r>
               <a:rPr lang="pt-BR" sz="1200" b="0" i="0" kern="1200" baseline="0" dirty="0" smtClean="0">
@@ -810,19 +795,7 @@
                 <a:ea typeface="+mn-ea"/>
                 <a:cs typeface="+mn-cs"/>
               </a:rPr>
-              <a:t> </a:t>
-            </a:r>
-            <a:r>
-              <a:rPr lang="pt-BR" sz="1200" b="0" i="0" kern="1200" baseline="0" dirty="0" smtClean="0">
-                <a:solidFill>
-                  <a:schemeClr val="tx1"/>
-                </a:solidFill>
-                <a:effectLst/>
-                <a:latin typeface="+mn-lt"/>
-                <a:ea typeface="+mn-ea"/>
-                <a:cs typeface="+mn-cs"/>
-              </a:rPr>
-              <a:t>.</a:t>
+              <a:t> .</a:t>
             </a:r>
             <a:endParaRPr lang="pt-BR" sz="1200" b="0" i="0" kern="1200" dirty="0" smtClean="0">
               <a:solidFill>
@@ -933,67 +906,7 @@
                 <a:ea typeface="+mn-ea"/>
                 <a:cs typeface="+mn-cs"/>
               </a:rPr>
-              <a:t>Funções </a:t>
-            </a:r>
-            <a:r>
-              <a:rPr lang="pt-BR" sz="1200" b="0" i="0" kern="1200" baseline="0" dirty="0" smtClean="0">
-                <a:solidFill>
-                  <a:schemeClr val="tx1"/>
-                </a:solidFill>
-                <a:effectLst/>
-                <a:latin typeface="+mn-lt"/>
-                <a:ea typeface="+mn-ea"/>
-                <a:cs typeface="+mn-cs"/>
-              </a:rPr>
-              <a:t>do módulo. O mais simples possível e à medida que for </a:t>
-            </a:r>
-            <a:r>
-              <a:rPr lang="pt-BR" sz="1200" b="0" i="0" kern="1200" baseline="0" dirty="0" smtClean="0">
-                <a:solidFill>
-                  <a:schemeClr val="tx1"/>
-                </a:solidFill>
-                <a:effectLst/>
-                <a:latin typeface="+mn-lt"/>
-                <a:ea typeface="+mn-ea"/>
-                <a:cs typeface="+mn-cs"/>
-              </a:rPr>
-              <a:t>necessário, </a:t>
-            </a:r>
-            <a:r>
-              <a:rPr lang="pt-BR" sz="1200" b="0" i="0" kern="1200" baseline="0" dirty="0" smtClean="0">
-                <a:solidFill>
-                  <a:schemeClr val="tx1"/>
-                </a:solidFill>
-                <a:effectLst/>
-                <a:latin typeface="+mn-lt"/>
-                <a:ea typeface="+mn-ea"/>
-                <a:cs typeface="+mn-cs"/>
-              </a:rPr>
-              <a:t>mais </a:t>
-            </a:r>
-            <a:r>
-              <a:rPr lang="pt-BR" sz="1200" b="0" i="0" kern="1200" baseline="0" dirty="0" smtClean="0">
-                <a:solidFill>
-                  <a:schemeClr val="tx1"/>
-                </a:solidFill>
-                <a:effectLst/>
-                <a:latin typeface="+mn-lt"/>
-                <a:ea typeface="+mn-ea"/>
-                <a:cs typeface="+mn-cs"/>
-              </a:rPr>
-              <a:t>elementos </a:t>
-            </a:r>
-            <a:r>
-              <a:rPr lang="pt-BR" sz="1200" b="0" i="0" kern="1200" baseline="0" dirty="0" smtClean="0">
-                <a:solidFill>
-                  <a:schemeClr val="tx1"/>
-                </a:solidFill>
-                <a:effectLst/>
-                <a:latin typeface="+mn-lt"/>
-                <a:ea typeface="+mn-ea"/>
-                <a:cs typeface="+mn-cs"/>
-              </a:rPr>
-              <a:t>serão apresentados.</a:t>
+              <a:t>Funções do módulo. O mais simples possível e à medida que for necessário, mais elementos serão apresentados.</a:t>
             </a:r>
           </a:p>
           <a:p>
@@ -1036,19 +949,7 @@
                 <a:ea typeface="+mn-ea"/>
                 <a:cs typeface="+mn-cs"/>
               </a:rPr>
-              <a:t> </a:t>
-            </a:r>
-            <a:r>
-              <a:rPr lang="pt-BR" sz="1200" b="0" i="0" kern="1200" baseline="0" dirty="0" smtClean="0">
-                <a:solidFill>
-                  <a:schemeClr val="tx1"/>
-                </a:solidFill>
-                <a:effectLst/>
-                <a:latin typeface="+mn-lt"/>
-                <a:ea typeface="+mn-ea"/>
-                <a:cs typeface="+mn-cs"/>
-              </a:rPr>
-              <a:t>, só que o mínimo possível.</a:t>
+              <a:t> , só que o mínimo possível.</a:t>
             </a:r>
           </a:p>
           <a:p>
@@ -1475,7 +1376,7 @@
           <a:p>
             <a:fld id="{44B8A51E-3842-4EAC-866C-3A2CB7D1A4DA}" type="datetimeFigureOut">
               <a:rPr lang="pt-BR" smtClean="0"/>
-              <a:t>01/06/2023</a:t>
+              <a:t>02/06/2023</a:t>
             </a:fld>
             <a:endParaRPr lang="pt-BR" dirty="0"/>
           </a:p>
@@ -1645,7 +1546,7 @@
           <a:p>
             <a:fld id="{44B8A51E-3842-4EAC-866C-3A2CB7D1A4DA}" type="datetimeFigureOut">
               <a:rPr lang="pt-BR" smtClean="0"/>
-              <a:t>01/06/2023</a:t>
+              <a:t>02/06/2023</a:t>
             </a:fld>
             <a:endParaRPr lang="pt-BR" dirty="0"/>
           </a:p>
@@ -1825,7 +1726,7 @@
           <a:p>
             <a:fld id="{44B8A51E-3842-4EAC-866C-3A2CB7D1A4DA}" type="datetimeFigureOut">
               <a:rPr lang="pt-BR" smtClean="0"/>
-              <a:t>01/06/2023</a:t>
+              <a:t>02/06/2023</a:t>
             </a:fld>
             <a:endParaRPr lang="pt-BR" dirty="0"/>
           </a:p>
@@ -1995,7 +1896,7 @@
           <a:p>
             <a:fld id="{44B8A51E-3842-4EAC-866C-3A2CB7D1A4DA}" type="datetimeFigureOut">
               <a:rPr lang="pt-BR" smtClean="0"/>
-              <a:t>01/06/2023</a:t>
+              <a:t>02/06/2023</a:t>
             </a:fld>
             <a:endParaRPr lang="pt-BR" dirty="0"/>
           </a:p>
@@ -2241,7 +2142,7 @@
           <a:p>
             <a:fld id="{44B8A51E-3842-4EAC-866C-3A2CB7D1A4DA}" type="datetimeFigureOut">
               <a:rPr lang="pt-BR" smtClean="0"/>
-              <a:t>01/06/2023</a:t>
+              <a:t>02/06/2023</a:t>
             </a:fld>
             <a:endParaRPr lang="pt-BR" dirty="0"/>
           </a:p>
@@ -2529,7 +2430,7 @@
           <a:p>
             <a:fld id="{44B8A51E-3842-4EAC-866C-3A2CB7D1A4DA}" type="datetimeFigureOut">
               <a:rPr lang="pt-BR" smtClean="0"/>
-              <a:t>01/06/2023</a:t>
+              <a:t>02/06/2023</a:t>
             </a:fld>
             <a:endParaRPr lang="pt-BR" dirty="0"/>
           </a:p>
@@ -2951,7 +2852,7 @@
           <a:p>
             <a:fld id="{44B8A51E-3842-4EAC-866C-3A2CB7D1A4DA}" type="datetimeFigureOut">
               <a:rPr lang="pt-BR" smtClean="0"/>
-              <a:t>01/06/2023</a:t>
+              <a:t>02/06/2023</a:t>
             </a:fld>
             <a:endParaRPr lang="pt-BR" dirty="0"/>
           </a:p>
@@ -3069,7 +2970,7 @@
           <a:p>
             <a:fld id="{44B8A51E-3842-4EAC-866C-3A2CB7D1A4DA}" type="datetimeFigureOut">
               <a:rPr lang="pt-BR" smtClean="0"/>
-              <a:t>01/06/2023</a:t>
+              <a:t>02/06/2023</a:t>
             </a:fld>
             <a:endParaRPr lang="pt-BR" dirty="0"/>
           </a:p>
@@ -3164,7 +3065,7 @@
           <a:p>
             <a:fld id="{44B8A51E-3842-4EAC-866C-3A2CB7D1A4DA}" type="datetimeFigureOut">
               <a:rPr lang="pt-BR" smtClean="0"/>
-              <a:t>01/06/2023</a:t>
+              <a:t>02/06/2023</a:t>
             </a:fld>
             <a:endParaRPr lang="pt-BR" dirty="0"/>
           </a:p>
@@ -3448,7 +3349,7 @@
           <a:p>
             <a:fld id="{44B8A51E-3842-4EAC-866C-3A2CB7D1A4DA}" type="datetimeFigureOut">
               <a:rPr lang="pt-BR" smtClean="0"/>
-              <a:t>01/06/2023</a:t>
+              <a:t>02/06/2023</a:t>
             </a:fld>
             <a:endParaRPr lang="pt-BR" dirty="0"/>
           </a:p>
@@ -3701,7 +3602,7 @@
           <a:p>
             <a:fld id="{44B8A51E-3842-4EAC-866C-3A2CB7D1A4DA}" type="datetimeFigureOut">
               <a:rPr lang="pt-BR" smtClean="0"/>
-              <a:t>01/06/2023</a:t>
+              <a:t>02/06/2023</a:t>
             </a:fld>
             <a:endParaRPr lang="pt-BR" dirty="0"/>
           </a:p>
@@ -3914,7 +3815,7 @@
           <a:p>
             <a:fld id="{44B8A51E-3842-4EAC-866C-3A2CB7D1A4DA}" type="datetimeFigureOut">
               <a:rPr lang="pt-BR" smtClean="0"/>
-              <a:t>01/06/2023</a:t>
+              <a:t>02/06/2023</a:t>
             </a:fld>
             <a:endParaRPr lang="pt-BR" dirty="0"/>
           </a:p>
@@ -4508,15 +4409,7 @@
           <a:p>
             <a:r>
               <a:rPr lang="pt-BR" dirty="0" smtClean="0"/>
-              <a:t>Na tela de </a:t>
-            </a:r>
-            <a:r>
-              <a:rPr lang="pt-BR" dirty="0" smtClean="0"/>
-              <a:t>Área do Cliente(login), só </a:t>
-            </a:r>
-            <a:r>
-              <a:rPr lang="pt-BR" dirty="0" smtClean="0"/>
-              <a:t>constar os campos CPF e senha. Caso o CPF informado pertença à uma rede, um novo campo para informar em qual filial irá logar-se será apresentado.</a:t>
+              <a:t>Na tela de Área do Cliente(login), só constar os campos CPF e senha. Caso o CPF informado pertença à uma rede, um novo campo para informar em qual filial irá logar-se será apresentado.</a:t>
             </a:r>
           </a:p>
           <a:p>
@@ -4528,15 +4421,7 @@
           <a:p>
             <a:r>
               <a:rPr lang="pt-BR" dirty="0" smtClean="0"/>
-              <a:t>Acrescentar </a:t>
-            </a:r>
-            <a:r>
-              <a:rPr lang="pt-BR" dirty="0" smtClean="0"/>
-              <a:t>”Esqueci minha </a:t>
-            </a:r>
-            <a:r>
-              <a:rPr lang="pt-BR" dirty="0" smtClean="0"/>
-              <a:t>senha” e informação de alerta caso tenha informado usuário e/ou senha errado.</a:t>
+              <a:t>Acrescentar ”Esqueci minha senha” e informação de alerta caso tenha informado usuário e/ou senha errado.</a:t>
             </a:r>
             <a:endParaRPr lang="pt-BR" dirty="0"/>
           </a:p>
@@ -4694,11 +4579,7 @@
           <a:p>
             <a:r>
               <a:rPr lang="pt-BR" dirty="0" smtClean="0"/>
-              <a:t>Layout geral do </a:t>
-            </a:r>
-            <a:r>
-              <a:rPr lang="pt-BR" dirty="0" smtClean="0"/>
-              <a:t>Sistema ERP Web</a:t>
+              <a:t>Layout geral do Sistema ERP Web</a:t>
             </a:r>
             <a:endParaRPr lang="pt-BR" dirty="0"/>
           </a:p>
@@ -5243,6 +5124,36 @@
 </file>
 
 <file path=ppt/slides/slide6.xml><?xml version="1.0" encoding="utf-8"?>
+<p:sld xmlns:a="http://schemas.openxmlformats.org/drawingml/2006/main" xmlns:r="http://schemas.openxmlformats.org/officeDocument/2006/relationships" xmlns:p="http://schemas.openxmlformats.org/presentationml/2006/main">
+  <p:cSld>
+    <p:spTree>
+      <p:nvGrpSpPr>
+        <p:cNvPr id="1" name=""/>
+        <p:cNvGrpSpPr/>
+        <p:nvPr/>
+      </p:nvGrpSpPr>
+      <p:grpSpPr>
+        <a:xfrm>
+          <a:off x="0" y="0"/>
+          <a:ext cx="0" cy="0"/>
+          <a:chOff x="0" y="0"/>
+          <a:chExt cx="0" cy="0"/>
+        </a:xfrm>
+      </p:grpSpPr>
+    </p:spTree>
+    <p:extLst>
+      <p:ext uri="{BB962C8B-B14F-4D97-AF65-F5344CB8AC3E}">
+        <p14:creationId xmlns:p14="http://schemas.microsoft.com/office/powerpoint/2010/main" val="1186111895"/>
+      </p:ext>
+    </p:extLst>
+  </p:cSld>
+  <p:clrMapOvr>
+    <a:masterClrMapping/>
+  </p:clrMapOvr>
+</p:sld>
+</file>
+
+<file path=ppt/slides/slide7.xml><?xml version="1.0" encoding="utf-8"?>
 <p:sld xmlns:a="http://schemas.openxmlformats.org/drawingml/2006/main" xmlns:r="http://schemas.openxmlformats.org/officeDocument/2006/relationships" xmlns:p="http://schemas.openxmlformats.org/presentationml/2006/main">
   <p:cSld>
     <p:spTree>

</xml_diff>

<commit_message>
Diversas alterações e novos arquivos.
</commit_message>
<xml_diff>
--- a/Projeto ERP WEB/Análise ERP WEB BioSistema.pptx
+++ b/Projeto ERP WEB/Análise ERP WEB BioSistema.pptx
@@ -197,7 +197,7 @@
           <a:p>
             <a:fld id="{6243CB1A-BA5C-4C34-AC0C-90CC0C1B0E03}" type="datetimeFigureOut">
               <a:rPr lang="pt-BR" smtClean="0"/>
-              <a:t>05/06/2023</a:t>
+              <a:t>06/06/2023</a:t>
             </a:fld>
             <a:endParaRPr lang="pt-BR" dirty="0"/>
           </a:p>
@@ -629,11 +629,7 @@
           <a:p>
             <a:r>
               <a:rPr lang="pt-BR" baseline="0" dirty="0" smtClean="0"/>
-              <a:t>-</a:t>
-            </a:r>
-            <a:r>
-              <a:rPr lang="pt-BR" baseline="0" dirty="0" smtClean="0"/>
-              <a:t>Menu</a:t>
+              <a:t>-Menu</a:t>
             </a:r>
           </a:p>
           <a:p>
@@ -1463,7 +1459,7 @@
           <a:p>
             <a:fld id="{44B8A51E-3842-4EAC-866C-3A2CB7D1A4DA}" type="datetimeFigureOut">
               <a:rPr lang="pt-BR" smtClean="0"/>
-              <a:t>05/06/2023</a:t>
+              <a:t>06/06/2023</a:t>
             </a:fld>
             <a:endParaRPr lang="pt-BR" dirty="0"/>
           </a:p>
@@ -1633,7 +1629,7 @@
           <a:p>
             <a:fld id="{44B8A51E-3842-4EAC-866C-3A2CB7D1A4DA}" type="datetimeFigureOut">
               <a:rPr lang="pt-BR" smtClean="0"/>
-              <a:t>05/06/2023</a:t>
+              <a:t>06/06/2023</a:t>
             </a:fld>
             <a:endParaRPr lang="pt-BR" dirty="0"/>
           </a:p>
@@ -1813,7 +1809,7 @@
           <a:p>
             <a:fld id="{44B8A51E-3842-4EAC-866C-3A2CB7D1A4DA}" type="datetimeFigureOut">
               <a:rPr lang="pt-BR" smtClean="0"/>
-              <a:t>05/06/2023</a:t>
+              <a:t>06/06/2023</a:t>
             </a:fld>
             <a:endParaRPr lang="pt-BR" dirty="0"/>
           </a:p>
@@ -1983,7 +1979,7 @@
           <a:p>
             <a:fld id="{44B8A51E-3842-4EAC-866C-3A2CB7D1A4DA}" type="datetimeFigureOut">
               <a:rPr lang="pt-BR" smtClean="0"/>
-              <a:t>05/06/2023</a:t>
+              <a:t>06/06/2023</a:t>
             </a:fld>
             <a:endParaRPr lang="pt-BR" dirty="0"/>
           </a:p>
@@ -2229,7 +2225,7 @@
           <a:p>
             <a:fld id="{44B8A51E-3842-4EAC-866C-3A2CB7D1A4DA}" type="datetimeFigureOut">
               <a:rPr lang="pt-BR" smtClean="0"/>
-              <a:t>05/06/2023</a:t>
+              <a:t>06/06/2023</a:t>
             </a:fld>
             <a:endParaRPr lang="pt-BR" dirty="0"/>
           </a:p>
@@ -2517,7 +2513,7 @@
           <a:p>
             <a:fld id="{44B8A51E-3842-4EAC-866C-3A2CB7D1A4DA}" type="datetimeFigureOut">
               <a:rPr lang="pt-BR" smtClean="0"/>
-              <a:t>05/06/2023</a:t>
+              <a:t>06/06/2023</a:t>
             </a:fld>
             <a:endParaRPr lang="pt-BR" dirty="0"/>
           </a:p>
@@ -2939,7 +2935,7 @@
           <a:p>
             <a:fld id="{44B8A51E-3842-4EAC-866C-3A2CB7D1A4DA}" type="datetimeFigureOut">
               <a:rPr lang="pt-BR" smtClean="0"/>
-              <a:t>05/06/2023</a:t>
+              <a:t>06/06/2023</a:t>
             </a:fld>
             <a:endParaRPr lang="pt-BR" dirty="0"/>
           </a:p>
@@ -3057,7 +3053,7 @@
           <a:p>
             <a:fld id="{44B8A51E-3842-4EAC-866C-3A2CB7D1A4DA}" type="datetimeFigureOut">
               <a:rPr lang="pt-BR" smtClean="0"/>
-              <a:t>05/06/2023</a:t>
+              <a:t>06/06/2023</a:t>
             </a:fld>
             <a:endParaRPr lang="pt-BR" dirty="0"/>
           </a:p>
@@ -3152,7 +3148,7 @@
           <a:p>
             <a:fld id="{44B8A51E-3842-4EAC-866C-3A2CB7D1A4DA}" type="datetimeFigureOut">
               <a:rPr lang="pt-BR" smtClean="0"/>
-              <a:t>05/06/2023</a:t>
+              <a:t>06/06/2023</a:t>
             </a:fld>
             <a:endParaRPr lang="pt-BR" dirty="0"/>
           </a:p>
@@ -3436,7 +3432,7 @@
           <a:p>
             <a:fld id="{44B8A51E-3842-4EAC-866C-3A2CB7D1A4DA}" type="datetimeFigureOut">
               <a:rPr lang="pt-BR" smtClean="0"/>
-              <a:t>05/06/2023</a:t>
+              <a:t>06/06/2023</a:t>
             </a:fld>
             <a:endParaRPr lang="pt-BR" dirty="0"/>
           </a:p>
@@ -3689,7 +3685,7 @@
           <a:p>
             <a:fld id="{44B8A51E-3842-4EAC-866C-3A2CB7D1A4DA}" type="datetimeFigureOut">
               <a:rPr lang="pt-BR" smtClean="0"/>
-              <a:t>05/06/2023</a:t>
+              <a:t>06/06/2023</a:t>
             </a:fld>
             <a:endParaRPr lang="pt-BR" dirty="0"/>
           </a:p>
@@ -3902,7 +3898,7 @@
           <a:p>
             <a:fld id="{44B8A51E-3842-4EAC-866C-3A2CB7D1A4DA}" type="datetimeFigureOut">
               <a:rPr lang="pt-BR" smtClean="0"/>
-              <a:t>05/06/2023</a:t>
+              <a:t>06/06/2023</a:t>
             </a:fld>
             <a:endParaRPr lang="pt-BR" dirty="0"/>
           </a:p>
@@ -4995,15 +4991,7 @@
           <a:p>
             <a:r>
               <a:rPr lang="pt-BR" dirty="0" smtClean="0"/>
-              <a:t>A </a:t>
-            </a:r>
-            <a:r>
-              <a:rPr lang="pt-BR" dirty="0" smtClean="0"/>
-              <a:t>Home Page deve ser de acordo </a:t>
-            </a:r>
-            <a:r>
-              <a:rPr lang="pt-BR" dirty="0" smtClean="0"/>
-              <a:t>com o perfil do usuário </a:t>
+              <a:t>A Home Page deve ser de acordo com o perfil do usuário </a:t>
             </a:r>
             <a:r>
               <a:rPr lang="pt-BR" dirty="0" err="1" smtClean="0"/>
@@ -5017,11 +5005,7 @@
           <a:p>
             <a:r>
               <a:rPr lang="pt-BR" dirty="0" smtClean="0"/>
-              <a:t>Tem que ter no cabeçalho a trilha de navegação do usuário</a:t>
-            </a:r>
-            <a:r>
-              <a:rPr lang="pt-BR" dirty="0" smtClean="0"/>
-              <a:t>.</a:t>
+              <a:t>Tem que ter no cabeçalho a trilha de navegação do usuário.</a:t>
             </a:r>
           </a:p>
           <a:p>
@@ -5053,7 +5037,6 @@
               <a:rPr lang="pt-BR" dirty="0" smtClean="0"/>
               <a:t>”.</a:t>
             </a:r>
-            <a:endParaRPr lang="pt-BR" dirty="0" smtClean="0"/>
           </a:p>
         </p:txBody>
       </p:sp>
@@ -5396,9 +5379,43 @@
           <a:chExt cx="0" cy="0"/>
         </a:xfrm>
       </p:grpSpPr>
+      <p:sp>
+        <p:nvSpPr>
+          <p:cNvPr id="2" name="CaixaDeTexto 1"/>
+          <p:cNvSpPr txBox="1"/>
+          <p:nvPr/>
+        </p:nvSpPr>
+        <p:spPr>
+          <a:xfrm>
+            <a:off x="699" y="5156048"/>
+            <a:ext cx="6035948" cy="369332"/>
+          </a:xfrm>
+          <a:prstGeom prst="rect">
+            <a:avLst/>
+          </a:prstGeom>
+          <a:noFill/>
+        </p:spPr>
+        <p:txBody>
+          <a:bodyPr wrap="none" rtlCol="0">
+            <a:spAutoFit/>
+          </a:bodyPr>
+          <a:lstStyle/>
+          <a:p>
+            <a:r>
+              <a:rPr lang="pt-BR" dirty="0" smtClean="0"/>
+              <a:t>Mostrar as opções “Pesquisar paciente”, “</a:t>
+            </a:r>
+            <a:r>
+              <a:rPr lang="pt-BR" smtClean="0"/>
+              <a:t>Cadastrar paciente”, </a:t>
+            </a:r>
+            <a:endParaRPr lang="pt-BR" dirty="0"/>
+          </a:p>
+        </p:txBody>
+      </p:sp>
       <p:pic>
         <p:nvPicPr>
-          <p:cNvPr id="1026" name="Picture 2"/>
+          <p:cNvPr id="3" name="Picture 2"/>
           <p:cNvPicPr>
             <a:picLocks noChangeAspect="1" noChangeArrowheads="1"/>
           </p:cNvPicPr>
@@ -5419,7 +5436,7 @@
         </p:blipFill>
         <p:spPr bwMode="auto">
           <a:xfrm>
-            <a:off x="699" y="35408"/>
+            <a:off x="699" y="-27384"/>
             <a:ext cx="9107805" cy="5120640"/>
           </a:xfrm>
           <a:prstGeom prst="rect">
@@ -5429,7 +5446,14 @@
           <a:ln>
             <a:noFill/>
           </a:ln>
-          <a:effectLst/>
+          <a:effectLst>
+            <a:glow rad="25400">
+              <a:schemeClr val="tx1"/>
+            </a:glow>
+            <a:outerShdw dist="35921" dir="2700000" algn="ctr" rotWithShape="0">
+              <a:schemeClr val="bg2"/>
+            </a:outerShdw>
+          </a:effectLst>
           <a:extLst>
             <a:ext uri="{909E8E84-426E-40DD-AFC4-6F175D3DCCD1}">
               <a14:hiddenFill xmlns:a14="http://schemas.microsoft.com/office/drawing/2010/main">
@@ -5448,52 +5472,9 @@
                 <a:tailEnd/>
               </a14:hiddenLine>
             </a:ext>
-            <a:ext uri="{AF507438-7753-43E0-B8FC-AC1667EBCBE1}">
-              <a14:hiddenEffects xmlns:a14="http://schemas.microsoft.com/office/drawing/2010/main">
-                <a:effectLst>
-                  <a:outerShdw dist="35921" dir="2700000" algn="ctr" rotWithShape="0">
-                    <a:schemeClr val="bg2"/>
-                  </a:outerShdw>
-                </a:effectLst>
-              </a14:hiddenEffects>
-            </a:ext>
           </a:extLst>
         </p:spPr>
       </p:pic>
-      <p:sp>
-        <p:nvSpPr>
-          <p:cNvPr id="2" name="CaixaDeTexto 1"/>
-          <p:cNvSpPr txBox="1"/>
-          <p:nvPr/>
-        </p:nvSpPr>
-        <p:spPr>
-          <a:xfrm>
-            <a:off x="699" y="5156048"/>
-            <a:ext cx="6035948" cy="369332"/>
-          </a:xfrm>
-          <a:prstGeom prst="rect">
-            <a:avLst/>
-          </a:prstGeom>
-          <a:noFill/>
-        </p:spPr>
-        <p:txBody>
-          <a:bodyPr wrap="none" rtlCol="0">
-            <a:spAutoFit/>
-          </a:bodyPr>
-          <a:lstStyle/>
-          <a:p>
-            <a:r>
-              <a:rPr lang="pt-BR" dirty="0" smtClean="0"/>
-              <a:t>Mostrar as opções “Pesquisar paciente”, “</a:t>
-            </a:r>
-            <a:r>
-              <a:rPr lang="pt-BR" smtClean="0"/>
-              <a:t>Cadastrar paciente”, </a:t>
-            </a:r>
-            <a:endParaRPr lang="pt-BR" dirty="0"/>
-          </a:p>
-        </p:txBody>
-      </p:sp>
     </p:spTree>
     <p:extLst>
       <p:ext uri="{BB962C8B-B14F-4D97-AF65-F5344CB8AC3E}">

</xml_diff>